<commit_message>
Fix non-working qplot code
</commit_message>
<xml_diff>
--- a/04_ExploratoryAnalysis/ggplot2/ppt/ggplot2.pptx
+++ b/04_ExploratoryAnalysis/ggplot2/ppt/ggplot2.pptx
@@ -234,7 +234,7 @@
           </a:lstStyle>
           <a:p>
             <a:fld id="{26588BF7-5BFF-FB4D-8C1A-970B23591857}" type="datetimeFigureOut">
-              <a:t>2/4/14</a:t>
+              <a:t>3/15/16</a:t>
             </a:fld>
             <a:endParaRPr lang="en-US"/>
           </a:p>
@@ -761,7 +761,7 @@
           <a:lstStyle/>
           <a:p>
             <a:fld id="{A65958ED-12ED-1142-8369-DADF60CDC5D9}" type="datetimeFigureOut">
-              <a:t>2/4/14</a:t>
+              <a:t>3/15/16</a:t>
             </a:fld>
             <a:endParaRPr lang="en-US"/>
           </a:p>
@@ -927,7 +927,7 @@
           <a:lstStyle/>
           <a:p>
             <a:fld id="{A65958ED-12ED-1142-8369-DADF60CDC5D9}" type="datetimeFigureOut">
-              <a:t>2/4/14</a:t>
+              <a:t>3/15/16</a:t>
             </a:fld>
             <a:endParaRPr lang="en-US"/>
           </a:p>
@@ -1103,7 +1103,7 @@
           <a:lstStyle/>
           <a:p>
             <a:fld id="{A65958ED-12ED-1142-8369-DADF60CDC5D9}" type="datetimeFigureOut">
-              <a:t>2/4/14</a:t>
+              <a:t>3/15/16</a:t>
             </a:fld>
             <a:endParaRPr lang="en-US"/>
           </a:p>
@@ -1269,7 +1269,7 @@
           <a:lstStyle/>
           <a:p>
             <a:fld id="{A65958ED-12ED-1142-8369-DADF60CDC5D9}" type="datetimeFigureOut">
-              <a:t>2/4/14</a:t>
+              <a:t>3/15/16</a:t>
             </a:fld>
             <a:endParaRPr lang="en-US"/>
           </a:p>
@@ -1512,7 +1512,7 @@
           <a:lstStyle/>
           <a:p>
             <a:fld id="{A65958ED-12ED-1142-8369-DADF60CDC5D9}" type="datetimeFigureOut">
-              <a:t>2/4/14</a:t>
+              <a:t>3/15/16</a:t>
             </a:fld>
             <a:endParaRPr lang="en-US"/>
           </a:p>
@@ -1795,7 +1795,7 @@
           <a:lstStyle/>
           <a:p>
             <a:fld id="{A65958ED-12ED-1142-8369-DADF60CDC5D9}" type="datetimeFigureOut">
-              <a:t>2/4/14</a:t>
+              <a:t>3/15/16</a:t>
             </a:fld>
             <a:endParaRPr lang="en-US"/>
           </a:p>
@@ -2217,7 +2217,7 @@
           <a:lstStyle/>
           <a:p>
             <a:fld id="{A65958ED-12ED-1142-8369-DADF60CDC5D9}" type="datetimeFigureOut">
-              <a:t>2/4/14</a:t>
+              <a:t>3/15/16</a:t>
             </a:fld>
             <a:endParaRPr lang="en-US"/>
           </a:p>
@@ -2332,7 +2332,7 @@
           <a:lstStyle/>
           <a:p>
             <a:fld id="{A65958ED-12ED-1142-8369-DADF60CDC5D9}" type="datetimeFigureOut">
-              <a:t>2/4/14</a:t>
+              <a:t>3/15/16</a:t>
             </a:fld>
             <a:endParaRPr lang="en-US"/>
           </a:p>
@@ -2425,7 +2425,7 @@
           <a:lstStyle/>
           <a:p>
             <a:fld id="{A65958ED-12ED-1142-8369-DADF60CDC5D9}" type="datetimeFigureOut">
-              <a:t>2/4/14</a:t>
+              <a:t>3/15/16</a:t>
             </a:fld>
             <a:endParaRPr lang="en-US"/>
           </a:p>
@@ -2698,7 +2698,7 @@
           <a:lstStyle/>
           <a:p>
             <a:fld id="{A65958ED-12ED-1142-8369-DADF60CDC5D9}" type="datetimeFigureOut">
-              <a:t>2/4/14</a:t>
+              <a:t>3/15/16</a:t>
             </a:fld>
             <a:endParaRPr lang="en-US"/>
           </a:p>
@@ -2948,7 +2948,7 @@
           <a:lstStyle/>
           <a:p>
             <a:fld id="{A65958ED-12ED-1142-8369-DADF60CDC5D9}" type="datetimeFigureOut">
-              <a:t>2/4/14</a:t>
+              <a:t>3/15/16</a:t>
             </a:fld>
             <a:endParaRPr lang="en-US"/>
           </a:p>
@@ -3157,7 +3157,7 @@
           </a:lstStyle>
           <a:p>
             <a:fld id="{A65958ED-12ED-1142-8369-DADF60CDC5D9}" type="datetimeFigureOut">
-              <a:t>2/4/14</a:t>
+              <a:t>3/15/16</a:t>
             </a:fld>
             <a:endParaRPr lang="en-US"/>
           </a:p>
@@ -3586,11 +3586,7 @@
           <a:p>
             <a:r>
               <a:rPr lang="en-US" sz="2400" i="1"/>
-              <a:t>Roger D. Peng, </a:t>
-            </a:r>
-            <a:r>
-              <a:rPr lang="en-US" sz="2400" i="1"/>
-              <a:t>Associate Professor of Biostatistics</a:t>
+              <a:t>Roger D. Peng, Associate Professor of Biostatistics</a:t>
             </a:r>
           </a:p>
           <a:p>
@@ -5458,7 +5454,7 @@
         </p:blipFill>
         <p:spPr>
           <a:xfrm>
-            <a:off x="1752176" y="975633"/>
+            <a:off x="1752176" y="1028548"/>
             <a:ext cx="5703154" cy="3616368"/>
           </a:xfrm>
           <a:prstGeom prst="rect">
@@ -5474,8 +5470,8 @@
         </p:nvSpPr>
         <p:spPr>
           <a:xfrm>
-            <a:off x="197057" y="4635799"/>
-            <a:ext cx="8676975" cy="338554"/>
+            <a:off x="800307" y="4613467"/>
+            <a:ext cx="7568799" cy="338554"/>
           </a:xfrm>
           <a:prstGeom prst="rect">
             <a:avLst/>
@@ -5489,129 +5485,53 @@
           <a:lstStyle/>
           <a:p>
             <a:r>
-              <a:rPr lang="en-US" sz="1600"/>
-              <a:t>qplot(log(pm25), log(eno), data = maacs, color = mopos, geom = c("point", "smooth"), method = "lm")</a:t>
-            </a:r>
-          </a:p>
-        </p:txBody>
-      </p:sp>
-      <p:sp>
-        <p:nvSpPr>
-          <p:cNvPr id="5" name="Rectangle 4"/>
-          <p:cNvSpPr/>
-          <p:nvPr/>
-        </p:nvSpPr>
-        <p:spPr>
-          <a:xfrm>
-            <a:off x="4893586" y="4646748"/>
-            <a:ext cx="2452267" cy="338554"/>
-          </a:xfrm>
-          <a:prstGeom prst="rect">
-            <a:avLst/>
-          </a:prstGeom>
-          <a:gradFill flip="none" rotWithShape="1">
-            <a:gsLst>
-              <a:gs pos="0">
-                <a:schemeClr val="accent1">
-                  <a:tint val="100000"/>
-                  <a:shade val="100000"/>
-                  <a:satMod val="130000"/>
-                  <a:alpha val="19000"/>
-                </a:schemeClr>
-              </a:gs>
-              <a:gs pos="100000">
-                <a:schemeClr val="accent1">
-                  <a:tint val="50000"/>
-                  <a:shade val="100000"/>
-                  <a:satMod val="350000"/>
-                  <a:alpha val="19000"/>
-                </a:schemeClr>
-              </a:gs>
-            </a:gsLst>
-            <a:lin ang="16200000" scaled="0"/>
-            <a:tileRect/>
-          </a:gradFill>
-        </p:spPr>
-        <p:style>
-          <a:lnRef idx="1">
-            <a:schemeClr val="accent1"/>
-          </a:lnRef>
-          <a:fillRef idx="3">
-            <a:schemeClr val="accent1"/>
-          </a:fillRef>
-          <a:effectRef idx="2">
-            <a:schemeClr val="accent1"/>
-          </a:effectRef>
-          <a:fontRef idx="minor">
-            <a:schemeClr val="lt1"/>
-          </a:fontRef>
-        </p:style>
-        <p:txBody>
-          <a:bodyPr rtlCol="0" anchor="ctr"/>
-          <a:lstStyle/>
-          <a:p>
-            <a:pPr algn="ctr"/>
-            <a:endParaRPr lang="en-US"/>
-          </a:p>
-        </p:txBody>
-      </p:sp>
-      <p:sp>
-        <p:nvSpPr>
-          <p:cNvPr id="7" name="Rectangle 6"/>
-          <p:cNvSpPr/>
-          <p:nvPr/>
-        </p:nvSpPr>
-        <p:spPr>
-          <a:xfrm>
-            <a:off x="7400590" y="4646748"/>
-            <a:ext cx="1346558" cy="338554"/>
-          </a:xfrm>
-          <a:prstGeom prst="rect">
-            <a:avLst/>
-          </a:prstGeom>
-          <a:gradFill flip="none" rotWithShape="1">
-            <a:gsLst>
-              <a:gs pos="0">
-                <a:schemeClr val="accent1">
-                  <a:tint val="100000"/>
-                  <a:shade val="100000"/>
-                  <a:satMod val="130000"/>
-                  <a:alpha val="19000"/>
-                </a:schemeClr>
-              </a:gs>
-              <a:gs pos="100000">
-                <a:schemeClr val="accent1">
-                  <a:tint val="50000"/>
-                  <a:shade val="100000"/>
-                  <a:satMod val="350000"/>
-                  <a:alpha val="19000"/>
-                </a:schemeClr>
-              </a:gs>
-            </a:gsLst>
-            <a:lin ang="16200000" scaled="0"/>
-            <a:tileRect/>
-          </a:gradFill>
-        </p:spPr>
-        <p:style>
-          <a:lnRef idx="1">
-            <a:schemeClr val="accent1"/>
-          </a:lnRef>
-          <a:fillRef idx="3">
-            <a:schemeClr val="accent1"/>
-          </a:fillRef>
-          <a:effectRef idx="2">
-            <a:schemeClr val="accent1"/>
-          </a:effectRef>
-          <a:fontRef idx="minor">
-            <a:schemeClr val="lt1"/>
-          </a:fontRef>
-        </p:style>
-        <p:txBody>
-          <a:bodyPr rtlCol="0" anchor="ctr"/>
-          <a:lstStyle/>
-          <a:p>
-            <a:pPr algn="ctr"/>
-            <a:endParaRPr lang="en-US"/>
+              <a:rPr lang="en-US" sz="1600" dirty="0" err="1"/>
+              <a:t>qplot</a:t>
+            </a:r>
+            <a:r>
+              <a:rPr lang="en-US" sz="1600" dirty="0"/>
+              <a:t>(log(pm25), log(</a:t>
+            </a:r>
+            <a:r>
+              <a:rPr lang="en-US" sz="1600" dirty="0" err="1"/>
+              <a:t>eno</a:t>
+            </a:r>
+            <a:r>
+              <a:rPr lang="en-US" sz="1600" dirty="0"/>
+              <a:t>), data = </a:t>
+            </a:r>
+            <a:r>
+              <a:rPr lang="en-US" sz="1600" dirty="0" err="1"/>
+              <a:t>maacs</a:t>
+            </a:r>
+            <a:r>
+              <a:rPr lang="en-US" sz="1600" dirty="0"/>
+              <a:t>, color = </a:t>
+            </a:r>
+            <a:r>
+              <a:rPr lang="en-US" sz="1600" dirty="0" err="1" smtClean="0"/>
+              <a:t>mopos</a:t>
+            </a:r>
+            <a:r>
+              <a:rPr lang="en-US" sz="1600" dirty="0" smtClean="0"/>
+              <a:t>) + </a:t>
+            </a:r>
+            <a:r>
+              <a:rPr lang="en-US" sz="1600" dirty="0" err="1" smtClean="0"/>
+              <a:t>geom_smooth</a:t>
+            </a:r>
+            <a:r>
+              <a:rPr lang="en-US" sz="1600" dirty="0" smtClean="0"/>
+              <a:t>(</a:t>
+            </a:r>
+            <a:r>
+              <a:rPr lang="en-US" sz="1600" dirty="0" smtClean="0"/>
+              <a:t>method </a:t>
+            </a:r>
+            <a:r>
+              <a:rPr lang="en-US" sz="1600" dirty="0"/>
+              <a:t>= "lm")</a:t>
+            </a:r>
           </a:p>
         </p:txBody>
       </p:sp>
@@ -5628,126 +5548,9 @@
   <p:timing>
     <p:tnLst>
       <p:par>
-        <p:cTn xmlns:p14="http://schemas.microsoft.com/office/powerpoint/2010/main" id="1" dur="indefinite" restart="never" nodeType="tmRoot">
-          <p:childTnLst>
-            <p:seq concurrent="1" nextAc="seek">
-              <p:cTn id="2" dur="indefinite" nodeType="mainSeq">
-                <p:childTnLst>
-                  <p:par>
-                    <p:cTn id="3" fill="hold">
-                      <p:stCondLst>
-                        <p:cond delay="indefinite"/>
-                      </p:stCondLst>
-                      <p:childTnLst>
-                        <p:par>
-                          <p:cTn id="4" fill="hold">
-                            <p:stCondLst>
-                              <p:cond delay="0"/>
-                            </p:stCondLst>
-                            <p:childTnLst>
-                              <p:par>
-                                <p:cTn id="5" presetID="1" presetClass="entr" presetSubtype="0" fill="hold" grpId="0" nodeType="clickEffect">
-                                  <p:stCondLst>
-                                    <p:cond delay="0"/>
-                                  </p:stCondLst>
-                                  <p:childTnLst>
-                                    <p:set>
-                                      <p:cBhvr>
-                                        <p:cTn id="6" dur="1" fill="hold">
-                                          <p:stCondLst>
-                                            <p:cond delay="0"/>
-                                          </p:stCondLst>
-                                        </p:cTn>
-                                        <p:tgtEl>
-                                          <p:spTgt spid="5"/>
-                                        </p:tgtEl>
-                                        <p:attrNameLst>
-                                          <p:attrName>style.visibility</p:attrName>
-                                        </p:attrNameLst>
-                                      </p:cBhvr>
-                                      <p:to>
-                                        <p:strVal val="visible"/>
-                                      </p:to>
-                                    </p:set>
-                                  </p:childTnLst>
-                                </p:cTn>
-                              </p:par>
-                            </p:childTnLst>
-                          </p:cTn>
-                        </p:par>
-                      </p:childTnLst>
-                    </p:cTn>
-                  </p:par>
-                  <p:par>
-                    <p:cTn id="7" fill="hold">
-                      <p:stCondLst>
-                        <p:cond delay="indefinite"/>
-                      </p:stCondLst>
-                      <p:childTnLst>
-                        <p:par>
-                          <p:cTn id="8" fill="hold">
-                            <p:stCondLst>
-                              <p:cond delay="0"/>
-                            </p:stCondLst>
-                            <p:childTnLst>
-                              <p:par>
-                                <p:cTn id="9" presetID="1" presetClass="entr" presetSubtype="0" fill="hold" grpId="0" nodeType="clickEffect">
-                                  <p:stCondLst>
-                                    <p:cond delay="0"/>
-                                  </p:stCondLst>
-                                  <p:childTnLst>
-                                    <p:set>
-                                      <p:cBhvr>
-                                        <p:cTn id="10" dur="1" fill="hold">
-                                          <p:stCondLst>
-                                            <p:cond delay="0"/>
-                                          </p:stCondLst>
-                                        </p:cTn>
-                                        <p:tgtEl>
-                                          <p:spTgt spid="7"/>
-                                        </p:tgtEl>
-                                        <p:attrNameLst>
-                                          <p:attrName>style.visibility</p:attrName>
-                                        </p:attrNameLst>
-                                      </p:cBhvr>
-                                      <p:to>
-                                        <p:strVal val="visible"/>
-                                      </p:to>
-                                    </p:set>
-                                  </p:childTnLst>
-                                </p:cTn>
-                              </p:par>
-                            </p:childTnLst>
-                          </p:cTn>
-                        </p:par>
-                      </p:childTnLst>
-                    </p:cTn>
-                  </p:par>
-                </p:childTnLst>
-              </p:cTn>
-              <p:prevCondLst>
-                <p:cond evt="onPrev" delay="0">
-                  <p:tgtEl>
-                    <p:sldTgt/>
-                  </p:tgtEl>
-                </p:cond>
-              </p:prevCondLst>
-              <p:nextCondLst>
-                <p:cond evt="onNext" delay="0">
-                  <p:tgtEl>
-                    <p:sldTgt/>
-                  </p:tgtEl>
-                </p:cond>
-              </p:nextCondLst>
-            </p:seq>
-          </p:childTnLst>
-        </p:cTn>
+        <p:cTn xmlns:p14="http://schemas.microsoft.com/office/powerpoint/2010/main" id="1" dur="indefinite" restart="never" nodeType="tmRoot"/>
       </p:par>
     </p:tnLst>
-    <p:bldLst>
-      <p:bldP spid="5" grpId="0" animBg="1"/>
-      <p:bldP spid="7" grpId="0" animBg="1"/>
-    </p:bldLst>
   </p:timing>
 </p:sld>
 </file>
@@ -5964,7 +5767,7 @@
         </p:blipFill>
         <p:spPr>
           <a:xfrm>
-            <a:off x="1028700" y="933690"/>
+            <a:off x="1028700" y="1007771"/>
             <a:ext cx="7073900" cy="3670300"/>
           </a:xfrm>
           <a:prstGeom prst="rect">
@@ -5980,8 +5783,8 @@
         </p:nvSpPr>
         <p:spPr>
           <a:xfrm>
-            <a:off x="77631" y="4675415"/>
-            <a:ext cx="9000681" cy="338554"/>
+            <a:off x="659715" y="4665310"/>
+            <a:ext cx="7943701" cy="338554"/>
           </a:xfrm>
           <a:prstGeom prst="rect">
             <a:avLst/>
@@ -5995,69 +5798,62 @@
           <a:lstStyle/>
           <a:p>
             <a:r>
-              <a:rPr lang="en-US" sz="1600"/>
-              <a:t>qplot(log(pm25), log(eno), data = maacs, geom = c("point", "smooth"), method = "lm", facets = . ~ mopos)</a:t>
-            </a:r>
-          </a:p>
-        </p:txBody>
-      </p:sp>
-      <p:sp>
-        <p:nvSpPr>
-          <p:cNvPr id="5" name="Rectangle 4"/>
-          <p:cNvSpPr/>
-          <p:nvPr/>
-        </p:nvSpPr>
-        <p:spPr>
-          <a:xfrm>
-            <a:off x="7302063" y="4679595"/>
-            <a:ext cx="1598351" cy="338554"/>
-          </a:xfrm>
-          <a:prstGeom prst="rect">
-            <a:avLst/>
-          </a:prstGeom>
-          <a:gradFill flip="none" rotWithShape="1">
-            <a:gsLst>
-              <a:gs pos="0">
-                <a:schemeClr val="accent1">
-                  <a:tint val="100000"/>
-                  <a:shade val="100000"/>
-                  <a:satMod val="130000"/>
-                  <a:alpha val="19000"/>
-                </a:schemeClr>
-              </a:gs>
-              <a:gs pos="100000">
-                <a:schemeClr val="accent1">
-                  <a:tint val="50000"/>
-                  <a:shade val="100000"/>
-                  <a:satMod val="350000"/>
-                  <a:alpha val="19000"/>
-                </a:schemeClr>
-              </a:gs>
-            </a:gsLst>
-            <a:lin ang="16200000" scaled="0"/>
-            <a:tileRect/>
-          </a:gradFill>
-        </p:spPr>
-        <p:style>
-          <a:lnRef idx="1">
-            <a:schemeClr val="accent1"/>
-          </a:lnRef>
-          <a:fillRef idx="3">
-            <a:schemeClr val="accent1"/>
-          </a:fillRef>
-          <a:effectRef idx="2">
-            <a:schemeClr val="accent1"/>
-          </a:effectRef>
-          <a:fontRef idx="minor">
-            <a:schemeClr val="lt1"/>
-          </a:fontRef>
-        </p:style>
-        <p:txBody>
-          <a:bodyPr rtlCol="0" anchor="ctr"/>
-          <a:lstStyle/>
-          <a:p>
-            <a:pPr algn="ctr"/>
-            <a:endParaRPr lang="en-US"/>
+              <a:rPr lang="en-US" sz="1600" dirty="0" err="1"/>
+              <a:t>qplot</a:t>
+            </a:r>
+            <a:r>
+              <a:rPr lang="en-US" sz="1600" dirty="0"/>
+              <a:t>(log(pm25), log(</a:t>
+            </a:r>
+            <a:r>
+              <a:rPr lang="en-US" sz="1600" dirty="0" err="1"/>
+              <a:t>eno</a:t>
+            </a:r>
+            <a:r>
+              <a:rPr lang="en-US" sz="1600" dirty="0"/>
+              <a:t>), data = </a:t>
+            </a:r>
+            <a:r>
+              <a:rPr lang="en-US" sz="1600" dirty="0" err="1"/>
+              <a:t>maacs</a:t>
+            </a:r>
+            <a:r>
+              <a:rPr lang="en-US" sz="1600" dirty="0"/>
+              <a:t>, </a:t>
+            </a:r>
+            <a:r>
+              <a:rPr lang="en-US" sz="1600" dirty="0" smtClean="0"/>
+              <a:t>facets = . ~ </a:t>
+            </a:r>
+            <a:r>
+              <a:rPr lang="en-US" sz="1600" dirty="0" err="1" smtClean="0"/>
+              <a:t>mopos</a:t>
+            </a:r>
+            <a:r>
+              <a:rPr lang="en-US" sz="1600" dirty="0" smtClean="0"/>
+              <a:t>) + </a:t>
+            </a:r>
+            <a:r>
+              <a:rPr lang="en-US" sz="1600" dirty="0" err="1" smtClean="0"/>
+              <a:t>geom_smooth</a:t>
+            </a:r>
+            <a:r>
+              <a:rPr lang="en-US" sz="1600" dirty="0" smtClean="0"/>
+              <a:t>(</a:t>
+            </a:r>
+            <a:r>
+              <a:rPr lang="en-US" sz="1600" dirty="0" smtClean="0"/>
+              <a:t>method </a:t>
+            </a:r>
+            <a:r>
+              <a:rPr lang="en-US" sz="1600" dirty="0"/>
+              <a:t>= "</a:t>
+            </a:r>
+            <a:r>
+              <a:rPr lang="en-US" sz="1600" dirty="0" smtClean="0"/>
+              <a:t>lm”)</a:t>
+            </a:r>
+            <a:endParaRPr lang="en-US" sz="1600" dirty="0"/>
           </a:p>
         </p:txBody>
       </p:sp>
@@ -6074,80 +5870,9 @@
   <p:timing>
     <p:tnLst>
       <p:par>
-        <p:cTn xmlns:p14="http://schemas.microsoft.com/office/powerpoint/2010/main" id="1" dur="indefinite" restart="never" nodeType="tmRoot">
-          <p:childTnLst>
-            <p:seq concurrent="1" nextAc="seek">
-              <p:cTn id="2" dur="indefinite" nodeType="mainSeq">
-                <p:childTnLst>
-                  <p:par>
-                    <p:cTn id="3" fill="hold">
-                      <p:stCondLst>
-                        <p:cond delay="indefinite"/>
-                      </p:stCondLst>
-                      <p:childTnLst>
-                        <p:par>
-                          <p:cTn id="4" fill="hold">
-                            <p:stCondLst>
-                              <p:cond delay="0"/>
-                            </p:stCondLst>
-                            <p:childTnLst>
-                              <p:par>
-                                <p:cTn id="5" presetID="1" presetClass="entr" presetSubtype="0" fill="hold" grpId="0" nodeType="clickEffect">
-                                  <p:stCondLst>
-                                    <p:cond delay="0"/>
-                                  </p:stCondLst>
-                                  <p:childTnLst>
-                                    <p:set>
-                                      <p:cBhvr>
-                                        <p:cTn id="6" dur="1" fill="hold">
-                                          <p:stCondLst>
-                                            <p:cond delay="0"/>
-                                          </p:stCondLst>
-                                        </p:cTn>
-                                        <p:tgtEl>
-                                          <p:spTgt spid="5"/>
-                                        </p:tgtEl>
-                                        <p:attrNameLst>
-                                          <p:attrName>style.visibility</p:attrName>
-                                        </p:attrNameLst>
-                                      </p:cBhvr>
-                                      <p:to>
-                                        <p:strVal val="visible"/>
-                                      </p:to>
-                                    </p:set>
-                                  </p:childTnLst>
-                                </p:cTn>
-                              </p:par>
-                            </p:childTnLst>
-                          </p:cTn>
-                        </p:par>
-                      </p:childTnLst>
-                    </p:cTn>
-                  </p:par>
-                </p:childTnLst>
-              </p:cTn>
-              <p:prevCondLst>
-                <p:cond evt="onPrev" delay="0">
-                  <p:tgtEl>
-                    <p:sldTgt/>
-                  </p:tgtEl>
-                </p:cond>
-              </p:prevCondLst>
-              <p:nextCondLst>
-                <p:cond evt="onNext" delay="0">
-                  <p:tgtEl>
-                    <p:sldTgt/>
-                  </p:tgtEl>
-                </p:cond>
-              </p:nextCondLst>
-            </p:seq>
-          </p:childTnLst>
-        </p:cTn>
+        <p:cTn xmlns:p14="http://schemas.microsoft.com/office/powerpoint/2010/main" id="1" dur="indefinite" restart="never" nodeType="tmRoot"/>
       </p:par>
     </p:tnLst>
-    <p:bldLst>
-      <p:bldP spid="5" grpId="0" animBg="1"/>
-    </p:bldLst>
   </p:timing>
 </p:sld>
 </file>

</xml_diff>